<commit_message>
updated the ppt template and the script
</commit_message>
<xml_diff>
--- a/ppt_template.pptx
+++ b/ppt_template.pptx
@@ -110,7 +110,7 @@
 </file>
 
 <file path=ppt/slideLayouts/slideLayout1.xml><?xml version="1.0" encoding="utf-8"?>
-<p:sldLayout xmlns:a="http://schemas.openxmlformats.org/drawingml/2006/main" xmlns:r="http://schemas.openxmlformats.org/officeDocument/2006/relationships" xmlns:p="http://schemas.openxmlformats.org/presentationml/2006/main" type="title" preserve="1">
+<p:sldLayout xmlns:a="http://schemas.openxmlformats.org/drawingml/2006/main" xmlns:r="http://schemas.openxmlformats.org/officeDocument/2006/relationships" xmlns:p="http://schemas.openxmlformats.org/presentationml/2006/main" showMasterSp="0" type="title" preserve="1">
   <p:cSld name="Title Slide">
     <p:spTree>
       <p:nvGrpSpPr>
@@ -128,58 +128,6 @@
       </p:grpSpPr>
       <p:sp>
         <p:nvSpPr>
-          <p:cNvPr id="7" name="Rectangle 6">
-            <a:extLst>
-              <a:ext uri="{FF2B5EF4-FFF2-40B4-BE49-F238E27FC236}">
-                <a16:creationId xmlns:a16="http://schemas.microsoft.com/office/drawing/2014/main" id="{356EEBFF-2949-3242-A034-B899D5731515}"/>
-              </a:ext>
-            </a:extLst>
-          </p:cNvPr>
-          <p:cNvSpPr/>
-          <p:nvPr userDrawn="1"/>
-        </p:nvSpPr>
-        <p:spPr>
-          <a:xfrm>
-            <a:off x="0" y="4572000"/>
-            <a:ext cx="6858000" cy="4572000"/>
-          </a:xfrm>
-          <a:prstGeom prst="rect">
-            <a:avLst/>
-          </a:prstGeom>
-          <a:solidFill>
-            <a:srgbClr val="0093D1"/>
-          </a:solidFill>
-          <a:ln>
-            <a:noFill/>
-          </a:ln>
-        </p:spPr>
-        <p:style>
-          <a:lnRef idx="2">
-            <a:schemeClr val="accent1">
-              <a:shade val="50000"/>
-            </a:schemeClr>
-          </a:lnRef>
-          <a:fillRef idx="1">
-            <a:schemeClr val="accent1"/>
-          </a:fillRef>
-          <a:effectRef idx="0">
-            <a:schemeClr val="accent1"/>
-          </a:effectRef>
-          <a:fontRef idx="minor">
-            <a:schemeClr val="lt1"/>
-          </a:fontRef>
-        </p:style>
-        <p:txBody>
-          <a:bodyPr rtlCol="0" anchor="ctr"/>
-          <a:lstStyle/>
-          <a:p>
-            <a:pPr algn="ctr"/>
-            <a:endParaRPr lang="en-US"/>
-          </a:p>
-        </p:txBody>
-      </p:sp>
-      <p:sp>
-        <p:nvSpPr>
           <p:cNvPr id="2" name="Title 1"/>
           <p:cNvSpPr>
             <a:spLocks noGrp="1"/>
@@ -190,8 +138,8 @@
         </p:nvSpPr>
         <p:spPr>
           <a:xfrm>
-            <a:off x="228602" y="228600"/>
-            <a:ext cx="6400800" cy="4114801"/>
+            <a:off x="228602" y="1915063"/>
+            <a:ext cx="6400800" cy="1863307"/>
           </a:xfrm>
           <a:noFill/>
           <a:ln>
@@ -199,27 +147,24 @@
           </a:ln>
         </p:spPr>
         <p:txBody>
-          <a:bodyPr lIns="0" rIns="0" anchor="ctr">
+          <a:bodyPr lIns="0" rIns="0" anchor="b">
             <a:normAutofit/>
           </a:bodyPr>
           <a:lstStyle>
-            <a:lvl1pPr algn="l">
-              <a:defRPr sz="6000">
+            <a:lvl1pPr algn="ctr">
+              <a:defRPr sz="3600">
                 <a:solidFill>
-                  <a:schemeClr val="tx1">
-                    <a:lumMod val="85000"/>
-                    <a:lumOff val="15000"/>
-                  </a:schemeClr>
+                  <a:srgbClr val="265C7C"/>
                 </a:solidFill>
+                <a:latin typeface="Source Sans Pro" panose="020B0503030403020204" pitchFamily="34" charset="77"/>
               </a:defRPr>
             </a:lvl1pPr>
           </a:lstStyle>
           <a:p>
             <a:r>
-              <a:rPr lang="en-US"/>
+              <a:rPr lang="en-US" dirty="0"/>
               <a:t>Click to edit Master title style</a:t>
             </a:r>
-            <a:endParaRPr lang="en-US" dirty="0"/>
           </a:p>
         </p:txBody>
       </p:sp>
@@ -235,19 +180,22 @@
         </p:nvSpPr>
         <p:spPr>
           <a:xfrm>
-            <a:off x="228600" y="4822723"/>
-            <a:ext cx="6400800" cy="4092677"/>
-          </a:xfrm>
-        </p:spPr>
-        <p:txBody>
-          <a:bodyPr lIns="0" rIns="0"/>
+            <a:off x="228600" y="5762445"/>
+            <a:ext cx="6400800" cy="3152955"/>
+          </a:xfrm>
+        </p:spPr>
+        <p:txBody>
+          <a:bodyPr lIns="0" rIns="0">
+            <a:normAutofit/>
+          </a:bodyPr>
           <a:lstStyle>
-            <a:lvl1pPr marL="0" indent="0" algn="l">
-              <a:buNone/>
-              <a:defRPr sz="1800">
+            <a:lvl1pPr marL="0" indent="0" algn="ctr">
+              <a:buNone/>
+              <a:defRPr sz="1000">
                 <a:solidFill>
-                  <a:schemeClr val="bg1"/>
+                  <a:schemeClr val="tx1"/>
                 </a:solidFill>
+                <a:latin typeface="Source Sans Pro" panose="020B0503030403020204" pitchFamily="34" charset="77"/>
               </a:defRPr>
             </a:lvl1pPr>
             <a:lvl2pPr marL="342900" indent="0" algn="ctr">
@@ -285,10 +233,9 @@
           </a:lstStyle>
           <a:p>
             <a:r>
-              <a:rPr lang="en-US"/>
+              <a:rPr lang="en-US" dirty="0"/>
               <a:t>Click to edit Master subtitle style</a:t>
             </a:r>
-            <a:endParaRPr lang="en-US" dirty="0"/>
           </a:p>
         </p:txBody>
       </p:sp>
@@ -318,7 +265,7 @@
             <a:fld id="{0DAB70E3-47D6-2842-9376-028C836601F0}" type="datetimeFigureOut">
               <a:rPr lang="en-US" smtClean="0"/>
               <a:pPr/>
-              <a:t>8/28/19</a:t>
+              <a:t>11/25/19</a:t>
             </a:fld>
             <a:endParaRPr lang="en-US" dirty="0"/>
           </a:p>
@@ -326,10 +273,10 @@
       </p:sp>
       <p:pic>
         <p:nvPicPr>
-          <p:cNvPr id="9" name="Picture 8">
-            <a:extLst>
-              <a:ext uri="{FF2B5EF4-FFF2-40B4-BE49-F238E27FC236}">
-                <a16:creationId xmlns:a16="http://schemas.microsoft.com/office/drawing/2014/main" id="{1B647B31-1676-C74E-87BD-1FD98A341209}"/>
+          <p:cNvPr id="8" name="Picture 7" descr="A picture containing kite&#10;&#10;Description automatically generated">
+            <a:extLst>
+              <a:ext uri="{FF2B5EF4-FFF2-40B4-BE49-F238E27FC236}">
+                <a16:creationId xmlns:a16="http://schemas.microsoft.com/office/drawing/2014/main" id="{1A3CC66B-CD53-ED4E-95D1-BCFA80A7CF6D}"/>
               </a:ext>
             </a:extLst>
           </p:cNvPr>
@@ -340,19 +287,60 @@
         </p:nvPicPr>
         <p:blipFill>
           <a:blip r:embed="rId2"/>
-          <a:srcRect/>
-          <a:stretch/>
+          <a:stretch>
+            <a:fillRect/>
+          </a:stretch>
         </p:blipFill>
         <p:spPr>
           <a:xfrm>
-            <a:off x="228602" y="228600"/>
-            <a:ext cx="1686564" cy="457200"/>
+            <a:off x="228601" y="194970"/>
+            <a:ext cx="910086" cy="910086"/>
           </a:xfrm>
           <a:prstGeom prst="rect">
             <a:avLst/>
           </a:prstGeom>
         </p:spPr>
       </p:pic>
+      <p:sp>
+        <p:nvSpPr>
+          <p:cNvPr id="5" name="TextBox 4">
+            <a:extLst>
+              <a:ext uri="{FF2B5EF4-FFF2-40B4-BE49-F238E27FC236}">
+                <a16:creationId xmlns:a16="http://schemas.microsoft.com/office/drawing/2014/main" id="{246BA408-DBEB-DC4B-A4C4-D3B9AC442C64}"/>
+              </a:ext>
+            </a:extLst>
+          </p:cNvPr>
+          <p:cNvSpPr txBox="1"/>
+          <p:nvPr userDrawn="1"/>
+        </p:nvSpPr>
+        <p:spPr>
+          <a:xfrm>
+            <a:off x="1813012" y="3970924"/>
+            <a:ext cx="3231975" cy="307777"/>
+          </a:xfrm>
+          <a:prstGeom prst="rect">
+            <a:avLst/>
+          </a:prstGeom>
+          <a:noFill/>
+        </p:spPr>
+        <p:txBody>
+          <a:bodyPr wrap="none" rtlCol="0">
+            <a:spAutoFit/>
+          </a:bodyPr>
+          <a:lstStyle/>
+          <a:p>
+            <a:r>
+              <a:rPr lang="en-US" sz="1400" dirty="0">
+                <a:solidFill>
+                  <a:srgbClr val="576471"/>
+                </a:solidFill>
+                <a:latin typeface="Source Sans Pro" panose="020B0503030403020204" pitchFamily="34" charset="77"/>
+              </a:rPr>
+              <a:t>EPMO Project Request Approval Process </a:t>
+            </a:r>
+          </a:p>
+        </p:txBody>
+      </p:sp>
     </p:spTree>
     <p:extLst>
       <p:ext uri="{BB962C8B-B14F-4D97-AF65-F5344CB8AC3E}">
@@ -475,7 +463,7 @@
           <a:p>
             <a:fld id="{0DAB70E3-47D6-2842-9376-028C836601F0}" type="datetimeFigureOut">
               <a:rPr lang="en-US" smtClean="0"/>
-              <a:t>8/28/19</a:t>
+              <a:t>11/25/19</a:t>
             </a:fld>
             <a:endParaRPr lang="en-US"/>
           </a:p>
@@ -565,8 +553,8 @@
         </p:nvSpPr>
         <p:spPr>
           <a:xfrm>
-            <a:off x="219547" y="4311074"/>
-            <a:ext cx="6391748" cy="2064922"/>
+            <a:off x="219547" y="4199384"/>
+            <a:ext cx="6391748" cy="2176612"/>
           </a:xfrm>
           <a:ln>
             <a:solidFill>
@@ -657,7 +645,7 @@
           <a:p>
             <a:fld id="{0DAB70E3-47D6-2842-9376-028C836601F0}" type="datetimeFigureOut">
               <a:rPr lang="en-US" smtClean="0"/>
-              <a:t>8/28/19</a:t>
+              <a:t>11/25/19</a:t>
             </a:fld>
             <a:endParaRPr lang="en-US"/>
           </a:p>
@@ -724,8 +712,8 @@
         </p:nvSpPr>
         <p:spPr>
           <a:xfrm>
-            <a:off x="219547" y="1068799"/>
-            <a:ext cx="3112129" cy="369332"/>
+            <a:off x="-6178" y="-33907"/>
+            <a:ext cx="3112129" cy="184666"/>
           </a:xfrm>
           <a:prstGeom prst="rect">
             <a:avLst/>
@@ -733,13 +721,13 @@
           <a:noFill/>
         </p:spPr>
         <p:txBody>
-          <a:bodyPr wrap="square" lIns="0" tIns="0" rIns="0" bIns="0" rtlCol="0">
+          <a:bodyPr wrap="square" lIns="0" tIns="0" rIns="0" bIns="0" rtlCol="0" anchor="t">
             <a:spAutoFit/>
           </a:bodyPr>
           <a:lstStyle/>
           <a:p>
             <a:r>
-              <a:rPr lang="en-US" sz="2400" dirty="0"/>
+              <a:rPr lang="en-US" sz="1200" dirty="0"/>
               <a:t>Project Proposal</a:t>
             </a:r>
           </a:p>
@@ -763,7 +751,7 @@
         </p:nvSpPr>
         <p:spPr>
           <a:xfrm>
-            <a:off x="236796" y="1549407"/>
+            <a:off x="236796" y="1100231"/>
             <a:ext cx="1828800" cy="548640"/>
           </a:xfrm>
           <a:ln>
@@ -807,7 +795,7 @@
         </p:nvSpPr>
         <p:spPr>
           <a:xfrm>
-            <a:off x="236796" y="2111300"/>
+            <a:off x="236796" y="1662124"/>
             <a:ext cx="1828800" cy="182880"/>
           </a:xfrm>
           <a:prstGeom prst="rect">
@@ -847,7 +835,7 @@
         </p:nvSpPr>
         <p:spPr>
           <a:xfrm>
-            <a:off x="2514703" y="1553473"/>
+            <a:off x="2514703" y="1104297"/>
             <a:ext cx="1828800" cy="548640"/>
           </a:xfrm>
           <a:ln>
@@ -895,7 +883,7 @@
         </p:nvSpPr>
         <p:spPr>
           <a:xfrm>
-            <a:off x="4772392" y="1559713"/>
+            <a:off x="4772392" y="1110537"/>
             <a:ext cx="1828800" cy="548640"/>
           </a:xfrm>
           <a:ln>
@@ -939,7 +927,7 @@
         </p:nvSpPr>
         <p:spPr>
           <a:xfrm>
-            <a:off x="2514703" y="2125976"/>
+            <a:off x="2514703" y="1676800"/>
             <a:ext cx="1828800" cy="182880"/>
           </a:xfrm>
           <a:prstGeom prst="rect">
@@ -975,7 +963,7 @@
         </p:nvSpPr>
         <p:spPr>
           <a:xfrm>
-            <a:off x="4772392" y="2124552"/>
+            <a:off x="4772392" y="1675376"/>
             <a:ext cx="1828800" cy="182880"/>
           </a:xfrm>
           <a:prstGeom prst="rect">
@@ -1011,7 +999,7 @@
         </p:nvSpPr>
         <p:spPr>
           <a:xfrm>
-            <a:off x="3438535" y="2444954"/>
+            <a:off x="3438535" y="2075988"/>
             <a:ext cx="593111" cy="215444"/>
           </a:xfrm>
           <a:prstGeom prst="rect">
@@ -1046,7 +1034,7 @@
         </p:nvSpPr>
         <p:spPr>
           <a:xfrm>
-            <a:off x="3435772" y="2816002"/>
+            <a:off x="3435772" y="2447036"/>
             <a:ext cx="1098378" cy="215444"/>
           </a:xfrm>
           <a:prstGeom prst="rect">
@@ -1081,7 +1069,7 @@
         </p:nvSpPr>
         <p:spPr>
           <a:xfrm>
-            <a:off x="3429000" y="3187050"/>
+            <a:off x="3429000" y="2818084"/>
             <a:ext cx="1262012" cy="215444"/>
           </a:xfrm>
           <a:prstGeom prst="rect">
@@ -1120,7 +1108,7 @@
         </p:nvSpPr>
         <p:spPr>
           <a:xfrm>
-            <a:off x="4691013" y="2421427"/>
+            <a:off x="4691013" y="2052461"/>
             <a:ext cx="1896644" cy="277812"/>
           </a:xfrm>
           <a:ln>
@@ -1168,7 +1156,7 @@
         </p:nvSpPr>
         <p:spPr>
           <a:xfrm>
-            <a:off x="4691013" y="2792475"/>
+            <a:off x="4691013" y="2423509"/>
             <a:ext cx="1896644" cy="277812"/>
           </a:xfrm>
           <a:ln>
@@ -1216,7 +1204,7 @@
         </p:nvSpPr>
         <p:spPr>
           <a:xfrm>
-            <a:off x="4691012" y="3159704"/>
+            <a:off x="4691012" y="2790738"/>
             <a:ext cx="1896644" cy="277812"/>
           </a:xfrm>
           <a:ln>
@@ -1260,7 +1248,7 @@
         </p:nvSpPr>
         <p:spPr>
           <a:xfrm>
-            <a:off x="3493949" y="3677477"/>
+            <a:off x="3493949" y="3372679"/>
             <a:ext cx="1189428" cy="184666"/>
           </a:xfrm>
           <a:prstGeom prst="rect">
@@ -1299,7 +1287,7 @@
         </p:nvSpPr>
         <p:spPr>
           <a:xfrm>
-            <a:off x="4801794" y="3644156"/>
+            <a:off x="4801794" y="3339358"/>
             <a:ext cx="1815263" cy="277812"/>
           </a:xfrm>
           <a:ln>
@@ -1343,7 +1331,7 @@
         </p:nvSpPr>
         <p:spPr>
           <a:xfrm>
-            <a:off x="237940" y="3697976"/>
+            <a:off x="237940" y="3393178"/>
             <a:ext cx="421462" cy="184666"/>
           </a:xfrm>
           <a:prstGeom prst="rect">
@@ -1382,7 +1370,7 @@
         </p:nvSpPr>
         <p:spPr>
           <a:xfrm>
-            <a:off x="1543030" y="3651403"/>
+            <a:off x="1543030" y="3346605"/>
             <a:ext cx="1815263" cy="277812"/>
           </a:xfrm>
           <a:ln>
@@ -1428,7 +1416,7 @@
         </p:nvCxnSpPr>
         <p:spPr>
           <a:xfrm>
-            <a:off x="220583" y="2325546"/>
+            <a:off x="220583" y="1876370"/>
             <a:ext cx="6367072" cy="0"/>
           </a:xfrm>
           <a:prstGeom prst="line">
@@ -1473,7 +1461,7 @@
         </p:nvCxnSpPr>
         <p:spPr>
           <a:xfrm>
-            <a:off x="219547" y="3548821"/>
+            <a:off x="219547" y="3244023"/>
             <a:ext cx="6397070" cy="0"/>
           </a:xfrm>
           <a:prstGeom prst="line">
@@ -1520,7 +1508,7 @@
         </p:nvSpPr>
         <p:spPr>
           <a:xfrm>
-            <a:off x="882177" y="244538"/>
+            <a:off x="914400" y="365760"/>
             <a:ext cx="5715000" cy="457200"/>
           </a:xfrm>
         </p:spPr>
@@ -1529,10 +1517,9 @@
           <a:lstStyle/>
           <a:p>
             <a:r>
-              <a:rPr lang="en-US"/>
+              <a:rPr lang="en-US" dirty="0"/>
               <a:t>Click to edit Master title style</a:t>
             </a:r>
-            <a:endParaRPr lang="en-US" dirty="0"/>
           </a:p>
         </p:txBody>
       </p:sp>
@@ -1552,7 +1539,7 @@
         </p:nvCxnSpPr>
         <p:spPr>
           <a:xfrm>
-            <a:off x="225938" y="4018291"/>
+            <a:off x="225938" y="3761619"/>
             <a:ext cx="6406123" cy="0"/>
           </a:xfrm>
           <a:prstGeom prst="line">
@@ -1595,7 +1582,7 @@
         </p:nvSpPr>
         <p:spPr>
           <a:xfrm>
-            <a:off x="240703" y="2452611"/>
+            <a:off x="240703" y="2083645"/>
             <a:ext cx="939296" cy="215444"/>
           </a:xfrm>
           <a:prstGeom prst="rect">
@@ -1630,7 +1617,7 @@
         </p:nvSpPr>
         <p:spPr>
           <a:xfrm>
-            <a:off x="237940" y="2823659"/>
+            <a:off x="237940" y="2454693"/>
             <a:ext cx="499496" cy="215444"/>
           </a:xfrm>
           <a:prstGeom prst="rect">
@@ -1665,7 +1652,7 @@
         </p:nvSpPr>
         <p:spPr>
           <a:xfrm>
-            <a:off x="231168" y="3194707"/>
+            <a:off x="231168" y="2825741"/>
             <a:ext cx="930319" cy="215444"/>
           </a:xfrm>
           <a:prstGeom prst="rect">
@@ -1704,7 +1691,7 @@
         </p:nvSpPr>
         <p:spPr>
           <a:xfrm>
-            <a:off x="1270001" y="2421427"/>
+            <a:off x="1270001" y="2052461"/>
             <a:ext cx="2061676" cy="277812"/>
           </a:xfrm>
           <a:ln>
@@ -1752,7 +1739,7 @@
         </p:nvSpPr>
         <p:spPr>
           <a:xfrm>
-            <a:off x="1270001" y="2792475"/>
+            <a:off x="1270001" y="2423509"/>
             <a:ext cx="2061676" cy="277812"/>
           </a:xfrm>
           <a:ln>
@@ -1800,7 +1787,7 @@
         </p:nvSpPr>
         <p:spPr>
           <a:xfrm>
-            <a:off x="1270000" y="3159704"/>
+            <a:off x="1270000" y="2790738"/>
             <a:ext cx="2061676" cy="277812"/>
           </a:xfrm>
           <a:ln>
@@ -1848,27 +1835,27 @@
         </p:nvSpPr>
         <p:spPr>
           <a:xfrm>
-            <a:off x="3526326" y="1068799"/>
-            <a:ext cx="3084969" cy="370290"/>
+            <a:off x="3772465" y="0"/>
+            <a:ext cx="3084969" cy="155121"/>
           </a:xfrm>
           <a:ln>
             <a:noFill/>
           </a:ln>
         </p:spPr>
         <p:txBody>
-          <a:bodyPr tIns="365760" bIns="365760" anchor="ctr">
+          <a:bodyPr lIns="0" tIns="365760" rIns="0" bIns="365760" anchor="ctr">
             <a:noAutofit/>
           </a:bodyPr>
           <a:lstStyle>
             <a:lvl1pPr marL="0" indent="0" algn="r">
               <a:buNone/>
-              <a:defRPr sz="2400"/>
+              <a:defRPr sz="1200"/>
             </a:lvl1pPr>
           </a:lstStyle>
           <a:p>
             <a:pPr lvl="0"/>
             <a:r>
-              <a:rPr lang="en-US"/>
+              <a:rPr lang="en-US" dirty="0"/>
               <a:t>Click to edit Master text styles</a:t>
             </a:r>
           </a:p>
@@ -2145,7 +2132,7 @@
         </p:nvSpPr>
         <p:spPr>
           <a:xfrm>
-            <a:off x="215477" y="4074214"/>
+            <a:off x="215477" y="3865668"/>
             <a:ext cx="3108960" cy="229668"/>
           </a:xfrm>
           <a:prstGeom prst="rect">
@@ -2160,10 +2147,10 @@
           <a:lstStyle/>
           <a:p>
             <a:r>
-              <a:rPr lang="en-US" sz="1600" dirty="0"/>
+              <a:rPr lang="en-US" sz="2000" dirty="0"/>
               <a:t>Project Description</a:t>
             </a:r>
-            <a:endParaRPr lang="en-US" sz="1100" dirty="0"/>
+            <a:endParaRPr lang="en-US" sz="1400" dirty="0"/>
           </a:p>
         </p:txBody>
       </p:sp>
@@ -2214,7 +2201,7 @@
           <a:p>
             <a:fld id="{0DAB70E3-47D6-2842-9376-028C836601F0}" type="datetimeFigureOut">
               <a:rPr lang="en-US" smtClean="0"/>
-              <a:t>8/28/19</a:t>
+              <a:t>11/25/19</a:t>
             </a:fld>
             <a:endParaRPr lang="en-US"/>
           </a:p>
@@ -2285,7 +2272,7 @@
         </p:nvSpPr>
         <p:spPr>
           <a:xfrm>
-            <a:off x="882177" y="244538"/>
+            <a:off x="914400" y="365760"/>
             <a:ext cx="5715000" cy="457200"/>
           </a:xfrm>
         </p:spPr>
@@ -2318,8 +2305,8 @@
         </p:nvSpPr>
         <p:spPr>
           <a:xfrm>
-            <a:off x="228600" y="1243702"/>
-            <a:ext cx="3108960" cy="3200400"/>
+            <a:off x="228600" y="1421404"/>
+            <a:ext cx="3108960" cy="3022697"/>
           </a:xfrm>
           <a:ln>
             <a:solidFill>
@@ -2358,38 +2345,37 @@
           <a:p>
             <a:pPr lvl="0"/>
             <a:r>
-              <a:rPr lang="en-US"/>
+              <a:rPr lang="en-US" dirty="0"/>
               <a:t>Click to edit Master text styles</a:t>
             </a:r>
           </a:p>
           <a:p>
             <a:pPr lvl="1"/>
             <a:r>
-              <a:rPr lang="en-US"/>
+              <a:rPr lang="en-US" dirty="0"/>
               <a:t>Second level</a:t>
             </a:r>
           </a:p>
           <a:p>
             <a:pPr lvl="2"/>
             <a:r>
-              <a:rPr lang="en-US"/>
+              <a:rPr lang="en-US" dirty="0"/>
               <a:t>Third level</a:t>
             </a:r>
           </a:p>
           <a:p>
             <a:pPr lvl="3"/>
             <a:r>
-              <a:rPr lang="en-US"/>
+              <a:rPr lang="en-US" dirty="0"/>
               <a:t>Fourth level</a:t>
             </a:r>
           </a:p>
           <a:p>
             <a:pPr lvl="4"/>
             <a:r>
-              <a:rPr lang="en-US"/>
+              <a:rPr lang="en-US" dirty="0"/>
               <a:t>Fifth level</a:t>
             </a:r>
-            <a:endParaRPr lang="en-US" dirty="0"/>
           </a:p>
         </p:txBody>
       </p:sp>
@@ -2407,7 +2393,7 @@
         </p:nvSpPr>
         <p:spPr>
           <a:xfrm>
-            <a:off x="228600" y="955739"/>
+            <a:off x="228600" y="1165606"/>
             <a:ext cx="3108960" cy="276998"/>
           </a:xfrm>
           <a:prstGeom prst="rect">
@@ -2447,8 +2433,8 @@
         </p:nvSpPr>
         <p:spPr>
           <a:xfrm>
-            <a:off x="3566160" y="1232737"/>
-            <a:ext cx="3108960" cy="3200400"/>
+            <a:off x="3566160" y="1421403"/>
+            <a:ext cx="3108960" cy="3011733"/>
           </a:xfrm>
           <a:ln>
             <a:solidFill>
@@ -2536,7 +2522,7 @@
         </p:nvSpPr>
         <p:spPr>
           <a:xfrm>
-            <a:off x="3566160" y="959096"/>
+            <a:off x="3566160" y="1139217"/>
             <a:ext cx="3108960" cy="276999"/>
           </a:xfrm>
           <a:prstGeom prst="rect">
@@ -2942,6 +2928,85 @@
               <a:t>Fifth level</a:t>
             </a:r>
             <a:endParaRPr lang="en-US" dirty="0"/>
+          </a:p>
+        </p:txBody>
+      </p:sp>
+      <p:sp>
+        <p:nvSpPr>
+          <p:cNvPr id="16" name="TextBox 15">
+            <a:extLst>
+              <a:ext uri="{FF2B5EF4-FFF2-40B4-BE49-F238E27FC236}">
+                <a16:creationId xmlns:a16="http://schemas.microsoft.com/office/drawing/2014/main" id="{49FB4119-3388-1340-BCA2-2601EDD45097}"/>
+              </a:ext>
+            </a:extLst>
+          </p:cNvPr>
+          <p:cNvSpPr txBox="1"/>
+          <p:nvPr userDrawn="1"/>
+        </p:nvSpPr>
+        <p:spPr>
+          <a:xfrm>
+            <a:off x="-6178" y="-33907"/>
+            <a:ext cx="3112129" cy="184666"/>
+          </a:xfrm>
+          <a:prstGeom prst="rect">
+            <a:avLst/>
+          </a:prstGeom>
+          <a:noFill/>
+        </p:spPr>
+        <p:txBody>
+          <a:bodyPr wrap="square" lIns="0" tIns="0" rIns="0" bIns="0" rtlCol="0" anchor="t">
+            <a:spAutoFit/>
+          </a:bodyPr>
+          <a:lstStyle/>
+          <a:p>
+            <a:r>
+              <a:rPr lang="en-US" sz="1200" dirty="0"/>
+              <a:t>Project Proposal</a:t>
+            </a:r>
+          </a:p>
+        </p:txBody>
+      </p:sp>
+      <p:sp>
+        <p:nvSpPr>
+          <p:cNvPr id="17" name="Text Placeholder 12">
+            <a:extLst>
+              <a:ext uri="{FF2B5EF4-FFF2-40B4-BE49-F238E27FC236}">
+                <a16:creationId xmlns:a16="http://schemas.microsoft.com/office/drawing/2014/main" id="{B803DF97-E6ED-6948-92F0-C719B7869066}"/>
+              </a:ext>
+            </a:extLst>
+          </p:cNvPr>
+          <p:cNvSpPr>
+            <a:spLocks noGrp="1"/>
+          </p:cNvSpPr>
+          <p:nvPr>
+            <p:ph type="body" sz="quarter" idx="27"/>
+          </p:nvPr>
+        </p:nvSpPr>
+        <p:spPr>
+          <a:xfrm>
+            <a:off x="3772465" y="0"/>
+            <a:ext cx="3084969" cy="155121"/>
+          </a:xfrm>
+          <a:ln>
+            <a:noFill/>
+          </a:ln>
+        </p:spPr>
+        <p:txBody>
+          <a:bodyPr lIns="0" tIns="365760" rIns="0" bIns="365760" anchor="ctr">
+            <a:noAutofit/>
+          </a:bodyPr>
+          <a:lstStyle>
+            <a:lvl1pPr marL="0" indent="0" algn="r">
+              <a:buNone/>
+              <a:defRPr sz="1200"/>
+            </a:lvl1pPr>
+          </a:lstStyle>
+          <a:p>
+            <a:pPr lvl="0"/>
+            <a:r>
+              <a:rPr lang="en-US" dirty="0"/>
+              <a:t>Click to edit Master text styles</a:t>
+            </a:r>
           </a:p>
         </p:txBody>
       </p:sp>
@@ -3129,7 +3194,7 @@
           <a:p>
             <a:fld id="{0DAB70E3-47D6-2842-9376-028C836601F0}" type="datetimeFigureOut">
               <a:rPr lang="en-US" smtClean="0"/>
-              <a:t>8/28/19</a:t>
+              <a:t>11/25/19</a:t>
             </a:fld>
             <a:endParaRPr lang="en-US"/>
           </a:p>
@@ -3501,7 +3566,7 @@
           <a:p>
             <a:fld id="{0DAB70E3-47D6-2842-9376-028C836601F0}" type="datetimeFigureOut">
               <a:rPr lang="en-US" smtClean="0"/>
-              <a:t>8/28/19</a:t>
+              <a:t>11/25/19</a:t>
             </a:fld>
             <a:endParaRPr lang="en-US"/>
           </a:p>
@@ -3619,7 +3684,7 @@
           <a:p>
             <a:fld id="{0DAB70E3-47D6-2842-9376-028C836601F0}" type="datetimeFigureOut">
               <a:rPr lang="en-US" smtClean="0"/>
-              <a:t>8/28/19</a:t>
+              <a:t>11/25/19</a:t>
             </a:fld>
             <a:endParaRPr lang="en-US"/>
           </a:p>
@@ -3829,7 +3894,7 @@
           <a:p>
             <a:fld id="{0DAB70E3-47D6-2842-9376-028C836601F0}" type="datetimeFigureOut">
               <a:rPr lang="en-US" smtClean="0"/>
-              <a:t>8/28/19</a:t>
+              <a:t>11/25/19</a:t>
             </a:fld>
             <a:endParaRPr lang="en-US"/>
           </a:p>
@@ -3924,7 +3989,7 @@
         </p:nvSpPr>
         <p:spPr>
           <a:xfrm>
-            <a:off x="914400" y="228599"/>
+            <a:off x="914400" y="372389"/>
             <a:ext cx="5715000" cy="457200"/>
           </a:xfrm>
           <a:prstGeom prst="rect">
@@ -3938,10 +4003,9 @@
           <a:lstStyle/>
           <a:p>
             <a:r>
-              <a:rPr lang="en-US"/>
+              <a:rPr lang="en-US" dirty="0"/>
               <a:t>Click to edit Master title style</a:t>
             </a:r>
-            <a:endParaRPr lang="en-US" dirty="0"/>
           </a:p>
         </p:txBody>
       </p:sp>
@@ -3957,8 +4021,8 @@
         </p:nvSpPr>
         <p:spPr>
           <a:xfrm>
-            <a:off x="228600" y="914400"/>
-            <a:ext cx="6400800" cy="7661378"/>
+            <a:off x="228600" y="1251284"/>
+            <a:ext cx="6400800" cy="7324494"/>
           </a:xfrm>
           <a:prstGeom prst="rect">
             <a:avLst/>
@@ -4042,7 +4106,7 @@
           <a:p>
             <a:fld id="{0DAB70E3-47D6-2842-9376-028C836601F0}" type="datetimeFigureOut">
               <a:rPr lang="en-US" smtClean="0"/>
-              <a:t>8/28/19</a:t>
+              <a:t>11/25/19</a:t>
             </a:fld>
             <a:endParaRPr lang="en-US"/>
           </a:p>
@@ -4148,7 +4212,7 @@
         </p:blipFill>
         <p:spPr>
           <a:xfrm>
-            <a:off x="228600" y="228600"/>
+            <a:off x="228600" y="365760"/>
             <a:ext cx="457200" cy="457200"/>
           </a:xfrm>
           <a:prstGeom prst="rect">

</xml_diff>